<commit_message>
Update Lets start with new combined storage figure, and new manuscript
</commit_message>
<xml_diff>
--- a/ModelMusings/Support/LetsStart/ColoradoRiverBasinAccounts-LetsStart.pptx
+++ b/ModelMusings/Support/LetsStart/ColoradoRiverBasinAccounts-LetsStart.pptx
@@ -7,7 +7,7 @@
   <p:sldIdLst>
     <p:sldId id="258" r:id="rId2"/>
     <p:sldId id="267" r:id="rId3"/>
-    <p:sldId id="257" r:id="rId4"/>
+    <p:sldId id="268" r:id="rId4"/>
     <p:sldId id="259" r:id="rId5"/>
     <p:sldId id="261" r:id="rId6"/>
   </p:sldIdLst>
@@ -263,7 +263,7 @@
           <a:p>
             <a:fld id="{80695A85-0000-41C1-B1AB-596518EE5666}" type="datetimeFigureOut">
               <a:rPr lang="en-US" smtClean="0"/>
-              <a:t>6/17/2022</a:t>
+              <a:t>9/26/2022</a:t>
             </a:fld>
             <a:endParaRPr lang="en-US"/>
           </a:p>
@@ -461,7 +461,7 @@
           <a:p>
             <a:fld id="{80695A85-0000-41C1-B1AB-596518EE5666}" type="datetimeFigureOut">
               <a:rPr lang="en-US" smtClean="0"/>
-              <a:t>6/17/2022</a:t>
+              <a:t>9/26/2022</a:t>
             </a:fld>
             <a:endParaRPr lang="en-US"/>
           </a:p>
@@ -669,7 +669,7 @@
           <a:p>
             <a:fld id="{80695A85-0000-41C1-B1AB-596518EE5666}" type="datetimeFigureOut">
               <a:rPr lang="en-US" smtClean="0"/>
-              <a:t>6/17/2022</a:t>
+              <a:t>9/26/2022</a:t>
             </a:fld>
             <a:endParaRPr lang="en-US"/>
           </a:p>
@@ -867,7 +867,7 @@
           <a:p>
             <a:fld id="{80695A85-0000-41C1-B1AB-596518EE5666}" type="datetimeFigureOut">
               <a:rPr lang="en-US" smtClean="0"/>
-              <a:t>6/17/2022</a:t>
+              <a:t>9/26/2022</a:t>
             </a:fld>
             <a:endParaRPr lang="en-US"/>
           </a:p>
@@ -1142,7 +1142,7 @@
           <a:p>
             <a:fld id="{80695A85-0000-41C1-B1AB-596518EE5666}" type="datetimeFigureOut">
               <a:rPr lang="en-US" smtClean="0"/>
-              <a:t>6/17/2022</a:t>
+              <a:t>9/26/2022</a:t>
             </a:fld>
             <a:endParaRPr lang="en-US"/>
           </a:p>
@@ -1407,7 +1407,7 @@
           <a:p>
             <a:fld id="{80695A85-0000-41C1-B1AB-596518EE5666}" type="datetimeFigureOut">
               <a:rPr lang="en-US" smtClean="0"/>
-              <a:t>6/17/2022</a:t>
+              <a:t>9/26/2022</a:t>
             </a:fld>
             <a:endParaRPr lang="en-US"/>
           </a:p>
@@ -1819,7 +1819,7 @@
           <a:p>
             <a:fld id="{80695A85-0000-41C1-B1AB-596518EE5666}" type="datetimeFigureOut">
               <a:rPr lang="en-US" smtClean="0"/>
-              <a:t>6/17/2022</a:t>
+              <a:t>9/26/2022</a:t>
             </a:fld>
             <a:endParaRPr lang="en-US"/>
           </a:p>
@@ -1960,7 +1960,7 @@
           <a:p>
             <a:fld id="{80695A85-0000-41C1-B1AB-596518EE5666}" type="datetimeFigureOut">
               <a:rPr lang="en-US" smtClean="0"/>
-              <a:t>6/17/2022</a:t>
+              <a:t>9/26/2022</a:t>
             </a:fld>
             <a:endParaRPr lang="en-US"/>
           </a:p>
@@ -2073,7 +2073,7 @@
           <a:p>
             <a:fld id="{80695A85-0000-41C1-B1AB-596518EE5666}" type="datetimeFigureOut">
               <a:rPr lang="en-US" smtClean="0"/>
-              <a:t>6/17/2022</a:t>
+              <a:t>9/26/2022</a:t>
             </a:fld>
             <a:endParaRPr lang="en-US"/>
           </a:p>
@@ -2384,7 +2384,7 @@
           <a:p>
             <a:fld id="{80695A85-0000-41C1-B1AB-596518EE5666}" type="datetimeFigureOut">
               <a:rPr lang="en-US" smtClean="0"/>
-              <a:t>6/17/2022</a:t>
+              <a:t>9/26/2022</a:t>
             </a:fld>
             <a:endParaRPr lang="en-US"/>
           </a:p>
@@ -2672,7 +2672,7 @@
           <a:p>
             <a:fld id="{80695A85-0000-41C1-B1AB-596518EE5666}" type="datetimeFigureOut">
               <a:rPr lang="en-US" smtClean="0"/>
-              <a:t>6/17/2022</a:t>
+              <a:t>9/26/2022</a:t>
             </a:fld>
             <a:endParaRPr lang="en-US"/>
           </a:p>
@@ -2913,7 +2913,7 @@
           <a:p>
             <a:fld id="{80695A85-0000-41C1-B1AB-596518EE5666}" type="datetimeFigureOut">
               <a:rPr lang="en-US" smtClean="0"/>
-              <a:t>6/17/2022</a:t>
+              <a:t>9/26/2022</a:t>
             </a:fld>
             <a:endParaRPr lang="en-US"/>
           </a:p>
@@ -3376,11 +3376,20 @@
                 </a:solidFill>
                 <a:latin typeface="Comic Sans MS" panose="030F0702030302020204" pitchFamily="66" charset="0"/>
               </a:rPr>
-              <a:t>Colorado River Basin Accounts – Lets Start!</a:t>
+              <a:t>Colorado River Basin Water Accounts – </a:t>
+            </a:r>
+            <a:r>
+              <a:rPr lang="en-US" sz="3200" b="1" dirty="0">
+                <a:solidFill>
+                  <a:srgbClr val="FF0000"/>
+                </a:solidFill>
+                <a:latin typeface="Comic Sans MS" panose="030F0702030302020204" pitchFamily="66" charset="0"/>
+              </a:rPr>
+              <a:t>Lets Start!</a:t>
             </a:r>
             <a:endParaRPr lang="en-US" sz="3200" dirty="0">
               <a:solidFill>
-                <a:srgbClr val="002060"/>
+                <a:srgbClr val="FF0000"/>
               </a:solidFill>
               <a:latin typeface="Comic Sans MS" panose="030F0702030302020204" pitchFamily="66" charset="0"/>
             </a:endParaRPr>
@@ -3471,7 +3480,7 @@
               <a:rPr lang="en-US" sz="1600" dirty="0">
                 <a:latin typeface="Comic Sans MS" panose="030F0702030302020204" pitchFamily="66" charset="0"/>
               </a:rPr>
-              <a:t>June 17, 2022</a:t>
+              <a:t>September 26, 2022</a:t>
             </a:r>
           </a:p>
         </p:txBody>
@@ -3660,14 +3669,6 @@
 <file path=ppt/slides/slide3.xml><?xml version="1.0" encoding="utf-8"?>
 <p:sld xmlns:a="http://schemas.openxmlformats.org/drawingml/2006/main" xmlns:r="http://schemas.openxmlformats.org/officeDocument/2006/relationships" xmlns:p="http://schemas.openxmlformats.org/presentationml/2006/main">
   <p:cSld>
-    <p:bg>
-      <p:bgPr>
-        <a:solidFill>
-          <a:srgbClr val="FEFAF8"/>
-        </a:solidFill>
-        <a:effectLst/>
-      </p:bgPr>
-    </p:bg>
     <p:spTree>
       <p:nvGrpSpPr>
         <p:cNvPr id="1" name=""/>
@@ -3682,53 +3683,12 @@
           <a:chExt cx="0" cy="0"/>
         </a:xfrm>
       </p:grpSpPr>
-      <p:sp>
-        <p:nvSpPr>
-          <p:cNvPr id="42" name="TextBox 41">
-            <a:extLst>
-              <a:ext uri="{FF2B5EF4-FFF2-40B4-BE49-F238E27FC236}">
-                <a16:creationId xmlns:a16="http://schemas.microsoft.com/office/drawing/2014/main" id="{75D10860-CB55-4B66-949E-1F34DFED7182}"/>
-              </a:ext>
-            </a:extLst>
-          </p:cNvPr>
-          <p:cNvSpPr txBox="1"/>
-          <p:nvPr/>
-        </p:nvSpPr>
-        <p:spPr>
-          <a:xfrm>
-            <a:off x="320759" y="428687"/>
-            <a:ext cx="11358126" cy="954107"/>
-          </a:xfrm>
-          <a:prstGeom prst="rect">
-            <a:avLst/>
-          </a:prstGeom>
-          <a:noFill/>
-        </p:spPr>
-        <p:txBody>
-          <a:bodyPr wrap="square" rtlCol="0">
-            <a:spAutoFit/>
-          </a:bodyPr>
-          <a:lstStyle/>
-          <a:p>
-            <a:pPr algn="ctr"/>
-            <a:r>
-              <a:rPr lang="en-US" sz="2800" b="1" dirty="0">
-                <a:solidFill>
-                  <a:srgbClr val="002060"/>
-                </a:solidFill>
-                <a:latin typeface="Comic Sans MS" panose="030F0702030302020204" pitchFamily="66" charset="0"/>
-              </a:rPr>
-              <a:t>Colorado River basin account balances are the water stored in a combined Lake Powell-Lake Mead system.</a:t>
-            </a:r>
-          </a:p>
-        </p:txBody>
-      </p:sp>
       <p:grpSp>
         <p:nvGrpSpPr>
-          <p:cNvPr id="3" name="Group 2">
-            <a:extLst>
-              <a:ext uri="{FF2B5EF4-FFF2-40B4-BE49-F238E27FC236}">
-                <a16:creationId xmlns:a16="http://schemas.microsoft.com/office/drawing/2014/main" id="{73E8DA14-DD75-4CA7-BD41-2D5B7D5BA1DE}"/>
+          <p:cNvPr id="44" name="Group 43">
+            <a:extLst>
+              <a:ext uri="{FF2B5EF4-FFF2-40B4-BE49-F238E27FC236}">
+                <a16:creationId xmlns:a16="http://schemas.microsoft.com/office/drawing/2014/main" id="{DAA51EB1-A667-4DD9-892B-A6D168CDE4E7}"/>
               </a:ext>
             </a:extLst>
           </p:cNvPr>
@@ -3737,172 +3697,42 @@
         </p:nvGrpSpPr>
         <p:grpSpPr>
           <a:xfrm>
-            <a:off x="1842067" y="1985214"/>
-            <a:ext cx="8333196" cy="4474111"/>
-            <a:chOff x="1524960" y="1340058"/>
-            <a:chExt cx="8333196" cy="4474111"/>
+            <a:off x="2760169" y="1382794"/>
+            <a:ext cx="6908403" cy="5361969"/>
+            <a:chOff x="2690500" y="998769"/>
+            <a:chExt cx="6908403" cy="5361969"/>
           </a:xfrm>
         </p:grpSpPr>
-        <p:sp>
-          <p:nvSpPr>
-            <p:cNvPr id="55" name="Rectangle 54">
+        <p:cxnSp>
+          <p:nvCxnSpPr>
+            <p:cNvPr id="17" name="Straight Arrow Connector 16">
               <a:extLst>
                 <a:ext uri="{FF2B5EF4-FFF2-40B4-BE49-F238E27FC236}">
-                  <a16:creationId xmlns:a16="http://schemas.microsoft.com/office/drawing/2014/main" id="{09A9C5E2-A204-47E7-9CEF-573175361E4F}"/>
-                </a:ext>
-              </a:extLst>
-            </p:cNvPr>
-            <p:cNvSpPr/>
-            <p:nvPr/>
-          </p:nvSpPr>
-          <p:spPr>
-            <a:xfrm>
-              <a:off x="3069473" y="2640733"/>
-              <a:ext cx="5515927" cy="2051642"/>
-            </a:xfrm>
-            <a:prstGeom prst="rect">
-              <a:avLst/>
-            </a:prstGeom>
-            <a:solidFill>
-              <a:schemeClr val="accent2">
-                <a:lumMod val="20000"/>
-                <a:lumOff val="80000"/>
-              </a:schemeClr>
-            </a:solidFill>
-            <a:ln w="38100">
-              <a:solidFill>
-                <a:srgbClr val="FF0000"/>
-              </a:solidFill>
-              <a:prstDash val="lgDash"/>
-            </a:ln>
-          </p:spPr>
-          <p:style>
-            <a:lnRef idx="2">
-              <a:schemeClr val="accent1">
-                <a:shade val="50000"/>
-              </a:schemeClr>
-            </a:lnRef>
-            <a:fillRef idx="1">
-              <a:schemeClr val="accent1"/>
-            </a:fillRef>
-            <a:effectRef idx="0">
-              <a:schemeClr val="accent1"/>
-            </a:effectRef>
-            <a:fontRef idx="minor">
-              <a:schemeClr val="lt1"/>
-            </a:fontRef>
-          </p:style>
-          <p:txBody>
-            <a:bodyPr rtlCol="0" anchor="ctr"/>
-            <a:lstStyle/>
-            <a:p>
-              <a:pPr algn="ctr"/>
-              <a:endParaRPr lang="en-US" dirty="0"/>
-            </a:p>
-          </p:txBody>
-        </p:sp>
-        <p:sp>
-          <p:nvSpPr>
-            <p:cNvPr id="45" name="TextBox 44">
-              <a:extLst>
-                <a:ext uri="{FF2B5EF4-FFF2-40B4-BE49-F238E27FC236}">
-                  <a16:creationId xmlns:a16="http://schemas.microsoft.com/office/drawing/2014/main" id="{6AC73C7C-E13F-46AA-8196-58DDA21003F9}"/>
-                </a:ext>
-              </a:extLst>
-            </p:cNvPr>
-            <p:cNvSpPr txBox="1"/>
-            <p:nvPr/>
-          </p:nvSpPr>
-          <p:spPr>
-            <a:xfrm>
-              <a:off x="8673146" y="1473811"/>
-              <a:ext cx="1185010" cy="830997"/>
-            </a:xfrm>
-            <a:prstGeom prst="rect">
-              <a:avLst/>
-            </a:prstGeom>
-            <a:noFill/>
-          </p:spPr>
-          <p:txBody>
-            <a:bodyPr wrap="square" rtlCol="0">
-              <a:spAutoFit/>
-            </a:bodyPr>
-            <a:lstStyle/>
-            <a:p>
-              <a:pPr algn="ctr"/>
-              <a:r>
-                <a:rPr lang="en-US" sz="2400" b="1" dirty="0"/>
-                <a:t>Upper Basin</a:t>
-              </a:r>
-            </a:p>
-          </p:txBody>
-        </p:sp>
-        <p:sp>
-          <p:nvSpPr>
-            <p:cNvPr id="46" name="TextBox 45">
-              <a:extLst>
-                <a:ext uri="{FF2B5EF4-FFF2-40B4-BE49-F238E27FC236}">
-                  <a16:creationId xmlns:a16="http://schemas.microsoft.com/office/drawing/2014/main" id="{593279EA-8729-4A49-A475-504E1D9EC0C0}"/>
-                </a:ext>
-              </a:extLst>
-            </p:cNvPr>
-            <p:cNvSpPr txBox="1"/>
-            <p:nvPr/>
-          </p:nvSpPr>
-          <p:spPr>
-            <a:xfrm>
-              <a:off x="1524960" y="4075463"/>
-              <a:ext cx="1161267" cy="830997"/>
-            </a:xfrm>
-            <a:prstGeom prst="rect">
-              <a:avLst/>
-            </a:prstGeom>
-            <a:noFill/>
-          </p:spPr>
-          <p:txBody>
-            <a:bodyPr wrap="square" rtlCol="0">
-              <a:spAutoFit/>
-            </a:bodyPr>
-            <a:lstStyle/>
-            <a:p>
-              <a:pPr algn="ctr"/>
-              <a:r>
-                <a:rPr lang="en-US" sz="2400" b="1" dirty="0"/>
-                <a:t>Lower Basin</a:t>
-              </a:r>
-            </a:p>
-          </p:txBody>
-        </p:sp>
-        <p:cxnSp>
-          <p:nvCxnSpPr>
-            <p:cNvPr id="47" name="Straight Arrow Connector 46">
-              <a:extLst>
-                <a:ext uri="{FF2B5EF4-FFF2-40B4-BE49-F238E27FC236}">
-                  <a16:creationId xmlns:a16="http://schemas.microsoft.com/office/drawing/2014/main" id="{07A3CBFC-8625-477E-8AB8-19E08D505A1C}"/>
+                  <a16:creationId xmlns:a16="http://schemas.microsoft.com/office/drawing/2014/main" id="{E51962E4-B72F-42E2-B377-4738A646E5D9}"/>
                 </a:ext>
               </a:extLst>
             </p:cNvPr>
             <p:cNvCxnSpPr>
               <a:cxnSpLocks/>
-              <a:stCxn id="48" idx="3"/>
+              <a:stCxn id="36" idx="1"/>
+              <a:endCxn id="36" idx="3"/>
             </p:cNvCxnSpPr>
             <p:nvPr/>
           </p:nvCxnSpPr>
           <p:spPr>
             <a:xfrm>
-              <a:off x="5745000" y="1940223"/>
-              <a:ext cx="322820" cy="645249"/>
+              <a:off x="4813191" y="6206850"/>
+              <a:ext cx="2762054" cy="0"/>
             </a:xfrm>
             <a:prstGeom prst="straightConnector1">
               <a:avLst/>
             </a:prstGeom>
-            <a:ln w="28575">
+            <a:ln>
               <a:solidFill>
-                <a:schemeClr val="accent1">
-                  <a:lumMod val="75000"/>
-                </a:schemeClr>
+                <a:srgbClr val="FF0000"/>
               </a:solidFill>
-              <a:tailEnd type="arrow"/>
+              <a:headEnd type="triangle"/>
+              <a:tailEnd type="triangle"/>
             </a:ln>
           </p:spPr>
           <p:style>
@@ -3934,8 +3764,8 @@
           </p:nvSpPr>
           <p:spPr>
             <a:xfrm>
-              <a:off x="4656854" y="1340058"/>
-              <a:ext cx="1088146" cy="1200329"/>
+              <a:off x="3595399" y="1555388"/>
+              <a:ext cx="1681418" cy="646331"/>
             </a:xfrm>
             <a:prstGeom prst="rect">
               <a:avLst/>
@@ -3962,42 +3792,6 @@
             </a:p>
           </p:txBody>
         </p:sp>
-        <p:sp>
-          <p:nvSpPr>
-            <p:cNvPr id="50" name="TextBox 49">
-              <a:extLst>
-                <a:ext uri="{FF2B5EF4-FFF2-40B4-BE49-F238E27FC236}">
-                  <a16:creationId xmlns:a16="http://schemas.microsoft.com/office/drawing/2014/main" id="{87D53EFC-B897-4E3D-809B-1CB197ADF3FA}"/>
-                </a:ext>
-              </a:extLst>
-            </p:cNvPr>
-            <p:cNvSpPr txBox="1"/>
-            <p:nvPr/>
-          </p:nvSpPr>
-          <p:spPr>
-            <a:xfrm>
-              <a:off x="1672336" y="5352504"/>
-              <a:ext cx="1728384" cy="461665"/>
-            </a:xfrm>
-            <a:prstGeom prst="rect">
-              <a:avLst/>
-            </a:prstGeom>
-            <a:noFill/>
-          </p:spPr>
-          <p:txBody>
-            <a:bodyPr wrap="square" rtlCol="0">
-              <a:spAutoFit/>
-            </a:bodyPr>
-            <a:lstStyle/>
-            <a:p>
-              <a:pPr algn="ctr"/>
-              <a:r>
-                <a:rPr lang="en-US" sz="2400" b="1" dirty="0"/>
-                <a:t>Mexico</a:t>
-              </a:r>
-            </a:p>
-          </p:txBody>
-        </p:sp>
         <p:cxnSp>
           <p:nvCxnSpPr>
             <p:cNvPr id="51" name="Straight Arrow Connector 50">
@@ -4014,8 +3808,8 @@
           </p:nvCxnSpPr>
           <p:spPr>
             <a:xfrm flipH="1">
-              <a:off x="8350326" y="1600920"/>
-              <a:ext cx="384830" cy="980946"/>
+              <a:off x="7216154" y="998769"/>
+              <a:ext cx="908943" cy="1404068"/>
             </a:xfrm>
             <a:prstGeom prst="straightConnector1">
               <a:avLst/>
@@ -4058,8 +3852,8 @@
           </p:nvSpPr>
           <p:spPr>
             <a:xfrm>
-              <a:off x="2536528" y="4496509"/>
-              <a:ext cx="442695" cy="912151"/>
+              <a:off x="3735244" y="4249897"/>
+              <a:ext cx="796015" cy="1489052"/>
             </a:xfrm>
             <a:custGeom>
               <a:avLst/>
@@ -4137,12 +3931,96 @@
             </a:p>
           </p:txBody>
         </p:sp>
+        <p:sp>
+          <p:nvSpPr>
+            <p:cNvPr id="89" name="TextBox 88">
+              <a:extLst>
+                <a:ext uri="{FF2B5EF4-FFF2-40B4-BE49-F238E27FC236}">
+                  <a16:creationId xmlns:a16="http://schemas.microsoft.com/office/drawing/2014/main" id="{2423B0B4-06DF-4FD3-B985-7B545F0A815E}"/>
+                </a:ext>
+              </a:extLst>
+            </p:cNvPr>
+            <p:cNvSpPr txBox="1"/>
+            <p:nvPr/>
+          </p:nvSpPr>
+          <p:spPr>
+            <a:xfrm>
+              <a:off x="7836373" y="1372890"/>
+              <a:ext cx="1762530" cy="707886"/>
+            </a:xfrm>
+            <a:prstGeom prst="rect">
+              <a:avLst/>
+            </a:prstGeom>
+            <a:noFill/>
+          </p:spPr>
+          <p:txBody>
+            <a:bodyPr wrap="square" rtlCol="0">
+              <a:spAutoFit/>
+            </a:bodyPr>
+            <a:lstStyle/>
+            <a:p>
+              <a:pPr algn="ctr"/>
+              <a:r>
+                <a:rPr lang="en-US" sz="2000" b="1" dirty="0">
+                  <a:solidFill>
+                    <a:schemeClr val="accent5">
+                      <a:lumMod val="50000"/>
+                    </a:schemeClr>
+                  </a:solidFill>
+                </a:rPr>
+                <a:t>Natural inflow to Lake Powell</a:t>
+              </a:r>
+            </a:p>
+          </p:txBody>
+        </p:sp>
+        <p:sp>
+          <p:nvSpPr>
+            <p:cNvPr id="92" name="TextBox 91">
+              <a:extLst>
+                <a:ext uri="{FF2B5EF4-FFF2-40B4-BE49-F238E27FC236}">
+                  <a16:creationId xmlns:a16="http://schemas.microsoft.com/office/drawing/2014/main" id="{08E0B068-F2C5-4EA7-9649-5E3FFA78AB04}"/>
+                </a:ext>
+              </a:extLst>
+            </p:cNvPr>
+            <p:cNvSpPr txBox="1"/>
+            <p:nvPr/>
+          </p:nvSpPr>
+          <p:spPr>
+            <a:xfrm>
+              <a:off x="2690500" y="3964314"/>
+              <a:ext cx="1381659" cy="707886"/>
+            </a:xfrm>
+            <a:prstGeom prst="rect">
+              <a:avLst/>
+            </a:prstGeom>
+            <a:noFill/>
+          </p:spPr>
+          <p:txBody>
+            <a:bodyPr wrap="square" rtlCol="0">
+              <a:spAutoFit/>
+            </a:bodyPr>
+            <a:lstStyle/>
+            <a:p>
+              <a:pPr algn="ctr"/>
+              <a:r>
+                <a:rPr lang="en-US" sz="2000" b="1" dirty="0">
+                  <a:solidFill>
+                    <a:schemeClr val="accent5">
+                      <a:lumMod val="50000"/>
+                    </a:schemeClr>
+                  </a:solidFill>
+                </a:rPr>
+                <a:t>Lake Mead Release</a:t>
+              </a:r>
+            </a:p>
+          </p:txBody>
+        </p:sp>
         <p:grpSp>
           <p:nvGrpSpPr>
-            <p:cNvPr id="84" name="Group 83">
+            <p:cNvPr id="4" name="Group 3">
               <a:extLst>
                 <a:ext uri="{FF2B5EF4-FFF2-40B4-BE49-F238E27FC236}">
-                  <a16:creationId xmlns:a16="http://schemas.microsoft.com/office/drawing/2014/main" id="{74260D08-1CE9-45EB-AC72-54A02B507BD4}"/>
+                  <a16:creationId xmlns:a16="http://schemas.microsoft.com/office/drawing/2014/main" id="{B851B22B-26E0-4F12-A987-0EDF9F8EB77C}"/>
                 </a:ext>
               </a:extLst>
             </p:cNvPr>
@@ -4151,18 +4029,725 @@
           </p:nvGrpSpPr>
           <p:grpSpPr>
             <a:xfrm>
-              <a:off x="4012900" y="3476566"/>
-              <a:ext cx="833152" cy="1109858"/>
-              <a:chOff x="8220673" y="2801341"/>
-              <a:chExt cx="833152" cy="1117506"/>
+              <a:off x="4641222" y="2438658"/>
+              <a:ext cx="3130475" cy="3560499"/>
+              <a:chOff x="4641222" y="2438658"/>
+              <a:chExt cx="3130475" cy="3560499"/>
             </a:xfrm>
           </p:grpSpPr>
+          <p:grpSp>
+            <p:nvGrpSpPr>
+              <p:cNvPr id="84" name="Group 83">
+                <a:extLst>
+                  <a:ext uri="{FF2B5EF4-FFF2-40B4-BE49-F238E27FC236}">
+                    <a16:creationId xmlns:a16="http://schemas.microsoft.com/office/drawing/2014/main" id="{74260D08-1CE9-45EB-AC72-54A02B507BD4}"/>
+                  </a:ext>
+                </a:extLst>
+              </p:cNvPr>
+              <p:cNvGrpSpPr/>
+              <p:nvPr/>
+            </p:nvGrpSpPr>
+            <p:grpSpPr>
+              <a:xfrm>
+                <a:off x="4641228" y="2878030"/>
+                <a:ext cx="3130469" cy="407354"/>
+                <a:chOff x="8554368" y="1144319"/>
+                <a:chExt cx="3130469" cy="410161"/>
+              </a:xfrm>
+            </p:grpSpPr>
+            <p:sp>
+              <p:nvSpPr>
+                <p:cNvPr id="67" name="Rectangle 66">
+                  <a:extLst>
+                    <a:ext uri="{FF2B5EF4-FFF2-40B4-BE49-F238E27FC236}">
+                      <a16:creationId xmlns:a16="http://schemas.microsoft.com/office/drawing/2014/main" id="{38C1A38B-CF86-43F5-91C2-C98DDD8891EE}"/>
+                    </a:ext>
+                  </a:extLst>
+                </p:cNvPr>
+                <p:cNvSpPr/>
+                <p:nvPr/>
+              </p:nvSpPr>
+              <p:spPr>
+                <a:xfrm>
+                  <a:off x="8554368" y="1144319"/>
+                  <a:ext cx="3130469" cy="410161"/>
+                </a:xfrm>
+                <a:prstGeom prst="rect">
+                  <a:avLst/>
+                </a:prstGeom>
+                <a:solidFill>
+                  <a:schemeClr val="accent1">
+                    <a:lumMod val="40000"/>
+                    <a:lumOff val="60000"/>
+                  </a:schemeClr>
+                </a:solidFill>
+                <a:ln>
+                  <a:solidFill>
+                    <a:srgbClr val="002060"/>
+                  </a:solidFill>
+                  <a:prstDash val="solid"/>
+                </a:ln>
+              </p:spPr>
+              <p:style>
+                <a:lnRef idx="2">
+                  <a:schemeClr val="accent1">
+                    <a:shade val="50000"/>
+                  </a:schemeClr>
+                </a:lnRef>
+                <a:fillRef idx="1">
+                  <a:schemeClr val="accent1"/>
+                </a:fillRef>
+                <a:effectRef idx="0">
+                  <a:schemeClr val="accent1"/>
+                </a:effectRef>
+                <a:fontRef idx="minor">
+                  <a:schemeClr val="lt1"/>
+                </a:fontRef>
+              </p:style>
+              <p:txBody>
+                <a:bodyPr rtlCol="0" anchor="ctr"/>
+                <a:lstStyle/>
+                <a:p>
+                  <a:pPr algn="ctr"/>
+                  <a:endParaRPr lang="en-US" dirty="0"/>
+                </a:p>
+              </p:txBody>
+            </p:sp>
+            <p:sp>
+              <p:nvSpPr>
+                <p:cNvPr id="77" name="TextBox 76">
+                  <a:extLst>
+                    <a:ext uri="{FF2B5EF4-FFF2-40B4-BE49-F238E27FC236}">
+                      <a16:creationId xmlns:a16="http://schemas.microsoft.com/office/drawing/2014/main" id="{C9A200B3-76D4-478F-8B97-14D2A846CC11}"/>
+                    </a:ext>
+                  </a:extLst>
+                </p:cNvPr>
+                <p:cNvSpPr txBox="1"/>
+                <p:nvPr/>
+              </p:nvSpPr>
+              <p:spPr>
+                <a:xfrm>
+                  <a:off x="9134124" y="1165471"/>
+                  <a:ext cx="1995168" cy="371877"/>
+                </a:xfrm>
+                <a:prstGeom prst="rect">
+                  <a:avLst/>
+                </a:prstGeom>
+                <a:noFill/>
+                <a:ln>
+                  <a:noFill/>
+                  <a:prstDash val="solid"/>
+                </a:ln>
+              </p:spPr>
+              <p:txBody>
+                <a:bodyPr wrap="square" rtlCol="0">
+                  <a:spAutoFit/>
+                </a:bodyPr>
+                <a:lstStyle/>
+                <a:p>
+                  <a:pPr algn="ctr"/>
+                  <a:r>
+                    <a:rPr lang="en-US" b="1" dirty="0"/>
+                    <a:t>Upper Basin</a:t>
+                  </a:r>
+                </a:p>
+              </p:txBody>
+            </p:sp>
+          </p:grpSp>
+          <p:grpSp>
+            <p:nvGrpSpPr>
+              <p:cNvPr id="83" name="Group 82">
+                <a:extLst>
+                  <a:ext uri="{FF2B5EF4-FFF2-40B4-BE49-F238E27FC236}">
+                    <a16:creationId xmlns:a16="http://schemas.microsoft.com/office/drawing/2014/main" id="{DF37BEBE-1BC8-4A6D-BC16-FF1BD7EFC79E}"/>
+                  </a:ext>
+                </a:extLst>
+              </p:cNvPr>
+              <p:cNvGrpSpPr/>
+              <p:nvPr/>
+            </p:nvGrpSpPr>
+            <p:grpSpPr>
+              <a:xfrm>
+                <a:off x="4641228" y="2438658"/>
+                <a:ext cx="3130469" cy="433580"/>
+                <a:chOff x="8617620" y="803779"/>
+                <a:chExt cx="2847460" cy="433580"/>
+              </a:xfrm>
+            </p:grpSpPr>
+            <p:sp>
+              <p:nvSpPr>
+                <p:cNvPr id="63" name="Rectangle 62">
+                  <a:extLst>
+                    <a:ext uri="{FF2B5EF4-FFF2-40B4-BE49-F238E27FC236}">
+                      <a16:creationId xmlns:a16="http://schemas.microsoft.com/office/drawing/2014/main" id="{9046A7DC-7210-411D-9AC4-0A007C1D3546}"/>
+                    </a:ext>
+                  </a:extLst>
+                </p:cNvPr>
+                <p:cNvSpPr/>
+                <p:nvPr/>
+              </p:nvSpPr>
+              <p:spPr>
+                <a:xfrm>
+                  <a:off x="8617620" y="803779"/>
+                  <a:ext cx="2847460" cy="433580"/>
+                </a:xfrm>
+                <a:prstGeom prst="rect">
+                  <a:avLst/>
+                </a:prstGeom>
+                <a:solidFill>
+                  <a:schemeClr val="accent1">
+                    <a:lumMod val="20000"/>
+                    <a:lumOff val="80000"/>
+                  </a:schemeClr>
+                </a:solidFill>
+                <a:ln>
+                  <a:solidFill>
+                    <a:srgbClr val="002060"/>
+                  </a:solidFill>
+                  <a:prstDash val="solid"/>
+                </a:ln>
+              </p:spPr>
+              <p:style>
+                <a:lnRef idx="2">
+                  <a:schemeClr val="accent1">
+                    <a:shade val="50000"/>
+                  </a:schemeClr>
+                </a:lnRef>
+                <a:fillRef idx="1">
+                  <a:schemeClr val="accent1"/>
+                </a:fillRef>
+                <a:effectRef idx="0">
+                  <a:schemeClr val="accent1"/>
+                </a:effectRef>
+                <a:fontRef idx="minor">
+                  <a:schemeClr val="lt1"/>
+                </a:fontRef>
+              </p:style>
+              <p:txBody>
+                <a:bodyPr rtlCol="0" anchor="ctr"/>
+                <a:lstStyle/>
+                <a:p>
+                  <a:pPr algn="ctr"/>
+                  <a:endParaRPr lang="en-US" dirty="0"/>
+                </a:p>
+              </p:txBody>
+            </p:sp>
+            <p:sp>
+              <p:nvSpPr>
+                <p:cNvPr id="78" name="TextBox 77">
+                  <a:extLst>
+                    <a:ext uri="{FF2B5EF4-FFF2-40B4-BE49-F238E27FC236}">
+                      <a16:creationId xmlns:a16="http://schemas.microsoft.com/office/drawing/2014/main" id="{9F520DFA-0C08-44DE-9BDA-D3602BDC2D63}"/>
+                    </a:ext>
+                  </a:extLst>
+                </p:cNvPr>
+                <p:cNvSpPr txBox="1"/>
+                <p:nvPr/>
+              </p:nvSpPr>
+              <p:spPr>
+                <a:xfrm>
+                  <a:off x="9157257" y="842868"/>
+                  <a:ext cx="1790207" cy="369332"/>
+                </a:xfrm>
+                <a:prstGeom prst="rect">
+                  <a:avLst/>
+                </a:prstGeom>
+                <a:noFill/>
+                <a:ln>
+                  <a:noFill/>
+                  <a:prstDash val="solid"/>
+                </a:ln>
+              </p:spPr>
+              <p:txBody>
+                <a:bodyPr wrap="square" rtlCol="0">
+                  <a:spAutoFit/>
+                </a:bodyPr>
+                <a:lstStyle/>
+                <a:p>
+                  <a:pPr algn="ctr"/>
+                  <a:r>
+                    <a:rPr lang="en-US" b="1" dirty="0"/>
+                    <a:t>Lower Basin</a:t>
+                  </a:r>
+                </a:p>
+              </p:txBody>
+            </p:sp>
+          </p:grpSp>
+          <p:grpSp>
+            <p:nvGrpSpPr>
+              <p:cNvPr id="18" name="Group 17">
+                <a:extLst>
+                  <a:ext uri="{FF2B5EF4-FFF2-40B4-BE49-F238E27FC236}">
+                    <a16:creationId xmlns:a16="http://schemas.microsoft.com/office/drawing/2014/main" id="{B34EE1C0-D8A9-4912-96CC-752A5EEB6AFC}"/>
+                  </a:ext>
+                </a:extLst>
+              </p:cNvPr>
+              <p:cNvGrpSpPr/>
+              <p:nvPr/>
+            </p:nvGrpSpPr>
+            <p:grpSpPr>
+              <a:xfrm>
+                <a:off x="4641228" y="3248509"/>
+                <a:ext cx="3130469" cy="369332"/>
+                <a:chOff x="8385315" y="2215908"/>
+                <a:chExt cx="3130469" cy="369332"/>
+              </a:xfrm>
+            </p:grpSpPr>
+            <p:sp>
+              <p:nvSpPr>
+                <p:cNvPr id="70" name="Rectangle 69">
+                  <a:extLst>
+                    <a:ext uri="{FF2B5EF4-FFF2-40B4-BE49-F238E27FC236}">
+                      <a16:creationId xmlns:a16="http://schemas.microsoft.com/office/drawing/2014/main" id="{AF724A9B-8497-401D-A6D2-92EE159A34B3}"/>
+                    </a:ext>
+                  </a:extLst>
+                </p:cNvPr>
+                <p:cNvSpPr/>
+                <p:nvPr/>
+              </p:nvSpPr>
+              <p:spPr>
+                <a:xfrm>
+                  <a:off x="8385315" y="2247538"/>
+                  <a:ext cx="3130469" cy="306072"/>
+                </a:xfrm>
+                <a:prstGeom prst="rect">
+                  <a:avLst/>
+                </a:prstGeom>
+                <a:solidFill>
+                  <a:schemeClr val="accent1">
+                    <a:lumMod val="60000"/>
+                    <a:lumOff val="40000"/>
+                  </a:schemeClr>
+                </a:solidFill>
+                <a:ln>
+                  <a:solidFill>
+                    <a:srgbClr val="002060"/>
+                  </a:solidFill>
+                  <a:prstDash val="solid"/>
+                </a:ln>
+              </p:spPr>
+              <p:style>
+                <a:lnRef idx="2">
+                  <a:schemeClr val="accent1">
+                    <a:shade val="50000"/>
+                  </a:schemeClr>
+                </a:lnRef>
+                <a:fillRef idx="1">
+                  <a:schemeClr val="accent1"/>
+                </a:fillRef>
+                <a:effectRef idx="0">
+                  <a:schemeClr val="accent1"/>
+                </a:effectRef>
+                <a:fontRef idx="minor">
+                  <a:schemeClr val="lt1"/>
+                </a:fontRef>
+              </p:style>
+              <p:txBody>
+                <a:bodyPr rtlCol="0" anchor="ctr"/>
+                <a:lstStyle/>
+                <a:p>
+                  <a:pPr algn="ctr"/>
+                  <a:endParaRPr lang="en-US"/>
+                </a:p>
+              </p:txBody>
+            </p:sp>
+            <p:sp>
+              <p:nvSpPr>
+                <p:cNvPr id="79" name="TextBox 78">
+                  <a:extLst>
+                    <a:ext uri="{FF2B5EF4-FFF2-40B4-BE49-F238E27FC236}">
+                      <a16:creationId xmlns:a16="http://schemas.microsoft.com/office/drawing/2014/main" id="{2D2C449B-9E78-4807-9778-D0916980C2F0}"/>
+                    </a:ext>
+                  </a:extLst>
+                </p:cNvPr>
+                <p:cNvSpPr txBox="1"/>
+                <p:nvPr/>
+              </p:nvSpPr>
+              <p:spPr>
+                <a:xfrm>
+                  <a:off x="9510844" y="2215908"/>
+                  <a:ext cx="903622" cy="369332"/>
+                </a:xfrm>
+                <a:prstGeom prst="rect">
+                  <a:avLst/>
+                </a:prstGeom>
+                <a:noFill/>
+                <a:ln>
+                  <a:noFill/>
+                  <a:prstDash val="solid"/>
+                </a:ln>
+              </p:spPr>
+              <p:txBody>
+                <a:bodyPr wrap="square" rtlCol="0">
+                  <a:spAutoFit/>
+                </a:bodyPr>
+                <a:lstStyle/>
+                <a:p>
+                  <a:pPr algn="ctr"/>
+                  <a:r>
+                    <a:rPr lang="en-US" b="1" dirty="0"/>
+                    <a:t>Mexico</a:t>
+                  </a:r>
+                </a:p>
+              </p:txBody>
+            </p:sp>
+          </p:grpSp>
+          <p:grpSp>
+            <p:nvGrpSpPr>
+              <p:cNvPr id="21" name="Group 20">
+                <a:extLst>
+                  <a:ext uri="{FF2B5EF4-FFF2-40B4-BE49-F238E27FC236}">
+                    <a16:creationId xmlns:a16="http://schemas.microsoft.com/office/drawing/2014/main" id="{6E81736E-2099-4E83-9FDF-4732E56C8364}"/>
+                  </a:ext>
+                </a:extLst>
+              </p:cNvPr>
+              <p:cNvGrpSpPr/>
+              <p:nvPr/>
+            </p:nvGrpSpPr>
+            <p:grpSpPr>
+              <a:xfrm>
+                <a:off x="4641222" y="4288033"/>
+                <a:ext cx="3130470" cy="1711124"/>
+                <a:chOff x="8161201" y="3258944"/>
+                <a:chExt cx="2253549" cy="1317399"/>
+              </a:xfrm>
+            </p:grpSpPr>
+            <p:sp>
+              <p:nvSpPr>
+                <p:cNvPr id="82" name="Rectangle 81">
+                  <a:extLst>
+                    <a:ext uri="{FF2B5EF4-FFF2-40B4-BE49-F238E27FC236}">
+                      <a16:creationId xmlns:a16="http://schemas.microsoft.com/office/drawing/2014/main" id="{DE60CD3E-6F06-4281-A03C-0690876DD08A}"/>
+                    </a:ext>
+                  </a:extLst>
+                </p:cNvPr>
+                <p:cNvSpPr/>
+                <p:nvPr/>
+              </p:nvSpPr>
+              <p:spPr>
+                <a:xfrm>
+                  <a:off x="8161201" y="3258944"/>
+                  <a:ext cx="2253549" cy="1317399"/>
+                </a:xfrm>
+                <a:prstGeom prst="rect">
+                  <a:avLst/>
+                </a:prstGeom>
+                <a:solidFill>
+                  <a:schemeClr val="accent2"/>
+                </a:solidFill>
+                <a:ln>
+                  <a:solidFill>
+                    <a:schemeClr val="tx1"/>
+                  </a:solidFill>
+                  <a:prstDash val="solid"/>
+                </a:ln>
+              </p:spPr>
+              <p:style>
+                <a:lnRef idx="2">
+                  <a:schemeClr val="accent1">
+                    <a:shade val="50000"/>
+                  </a:schemeClr>
+                </a:lnRef>
+                <a:fillRef idx="1">
+                  <a:schemeClr val="accent1"/>
+                </a:fillRef>
+                <a:effectRef idx="0">
+                  <a:schemeClr val="accent1"/>
+                </a:effectRef>
+                <a:fontRef idx="minor">
+                  <a:schemeClr val="lt1"/>
+                </a:fontRef>
+              </p:style>
+              <p:txBody>
+                <a:bodyPr rtlCol="0" anchor="ctr"/>
+                <a:lstStyle/>
+                <a:p>
+                  <a:pPr algn="ctr"/>
+                  <a:endParaRPr lang="en-US"/>
+                </a:p>
+              </p:txBody>
+            </p:sp>
+            <p:sp>
+              <p:nvSpPr>
+                <p:cNvPr id="88" name="TextBox 87">
+                  <a:extLst>
+                    <a:ext uri="{FF2B5EF4-FFF2-40B4-BE49-F238E27FC236}">
+                      <a16:creationId xmlns:a16="http://schemas.microsoft.com/office/drawing/2014/main" id="{9125E6FD-8297-4895-95C7-ACF0860DC807}"/>
+                    </a:ext>
+                  </a:extLst>
+                </p:cNvPr>
+                <p:cNvSpPr txBox="1"/>
+                <p:nvPr/>
+              </p:nvSpPr>
+              <p:spPr>
+                <a:xfrm>
+                  <a:off x="8595786" y="3705725"/>
+                  <a:ext cx="1419044" cy="369332"/>
+                </a:xfrm>
+                <a:prstGeom prst="rect">
+                  <a:avLst/>
+                </a:prstGeom>
+                <a:noFill/>
+                <a:ln>
+                  <a:noFill/>
+                  <a:prstDash val="solid"/>
+                </a:ln>
+              </p:spPr>
+              <p:txBody>
+                <a:bodyPr wrap="square" rtlCol="0">
+                  <a:spAutoFit/>
+                </a:bodyPr>
+                <a:lstStyle/>
+                <a:p>
+                  <a:pPr algn="ctr"/>
+                  <a:r>
+                    <a:rPr lang="en-US" b="1" dirty="0"/>
+                    <a:t>Shared Reserve</a:t>
+                  </a:r>
+                </a:p>
+              </p:txBody>
+            </p:sp>
+          </p:grpSp>
+          <p:grpSp>
+            <p:nvGrpSpPr>
+              <p:cNvPr id="56" name="Group 55">
+                <a:extLst>
+                  <a:ext uri="{FF2B5EF4-FFF2-40B4-BE49-F238E27FC236}">
+                    <a16:creationId xmlns:a16="http://schemas.microsoft.com/office/drawing/2014/main" id="{158C8481-6E0F-4AAB-A87B-D84885668DDF}"/>
+                  </a:ext>
+                </a:extLst>
+              </p:cNvPr>
+              <p:cNvGrpSpPr/>
+              <p:nvPr/>
+            </p:nvGrpSpPr>
+            <p:grpSpPr>
+              <a:xfrm>
+                <a:off x="4641226" y="3562928"/>
+                <a:ext cx="3130469" cy="369332"/>
+                <a:chOff x="8472250" y="3086107"/>
+                <a:chExt cx="2764032" cy="268644"/>
+              </a:xfrm>
+            </p:grpSpPr>
+            <p:sp>
+              <p:nvSpPr>
+                <p:cNvPr id="57" name="Rectangle 56">
+                  <a:extLst>
+                    <a:ext uri="{FF2B5EF4-FFF2-40B4-BE49-F238E27FC236}">
+                      <a16:creationId xmlns:a16="http://schemas.microsoft.com/office/drawing/2014/main" id="{B7745B29-FC79-4E5E-B2EB-F4094C43C6D7}"/>
+                    </a:ext>
+                  </a:extLst>
+                </p:cNvPr>
+                <p:cNvSpPr/>
+                <p:nvPr/>
+              </p:nvSpPr>
+              <p:spPr>
+                <a:xfrm>
+                  <a:off x="8472250" y="3099809"/>
+                  <a:ext cx="2764032" cy="214997"/>
+                </a:xfrm>
+                <a:prstGeom prst="rect">
+                  <a:avLst/>
+                </a:prstGeom>
+                <a:solidFill>
+                  <a:srgbClr val="7395D3"/>
+                </a:solidFill>
+                <a:ln>
+                  <a:solidFill>
+                    <a:schemeClr val="tx1"/>
+                  </a:solidFill>
+                  <a:prstDash val="solid"/>
+                </a:ln>
+              </p:spPr>
+              <p:style>
+                <a:lnRef idx="2">
+                  <a:schemeClr val="accent1">
+                    <a:shade val="50000"/>
+                  </a:schemeClr>
+                </a:lnRef>
+                <a:fillRef idx="1">
+                  <a:schemeClr val="accent1"/>
+                </a:fillRef>
+                <a:effectRef idx="0">
+                  <a:schemeClr val="accent1"/>
+                </a:effectRef>
+                <a:fontRef idx="minor">
+                  <a:schemeClr val="lt1"/>
+                </a:fontRef>
+              </p:style>
+              <p:txBody>
+                <a:bodyPr rtlCol="0" anchor="ctr"/>
+                <a:lstStyle/>
+                <a:p>
+                  <a:pPr algn="ctr"/>
+                  <a:endParaRPr lang="en-US" dirty="0"/>
+                </a:p>
+              </p:txBody>
+            </p:sp>
+            <p:sp>
+              <p:nvSpPr>
+                <p:cNvPr id="58" name="TextBox 57">
+                  <a:extLst>
+                    <a:ext uri="{FF2B5EF4-FFF2-40B4-BE49-F238E27FC236}">
+                      <a16:creationId xmlns:a16="http://schemas.microsoft.com/office/drawing/2014/main" id="{B5987608-C45B-4394-99DA-2987C6434ED0}"/>
+                    </a:ext>
+                  </a:extLst>
+                </p:cNvPr>
+                <p:cNvSpPr txBox="1"/>
+                <p:nvPr/>
+              </p:nvSpPr>
+              <p:spPr>
+                <a:xfrm>
+                  <a:off x="9423037" y="3086107"/>
+                  <a:ext cx="883841" cy="268644"/>
+                </a:xfrm>
+                <a:prstGeom prst="rect">
+                  <a:avLst/>
+                </a:prstGeom>
+                <a:noFill/>
+                <a:ln>
+                  <a:noFill/>
+                  <a:prstDash val="solid"/>
+                </a:ln>
+              </p:spPr>
+              <p:txBody>
+                <a:bodyPr wrap="square" rtlCol="0">
+                  <a:spAutoFit/>
+                </a:bodyPr>
+                <a:lstStyle/>
+                <a:p>
+                  <a:pPr algn="ctr"/>
+                  <a:r>
+                    <a:rPr lang="en-US" b="1" dirty="0"/>
+                    <a:t>Delta</a:t>
+                  </a:r>
+                </a:p>
+              </p:txBody>
+            </p:sp>
+          </p:grpSp>
+          <p:grpSp>
+            <p:nvGrpSpPr>
+              <p:cNvPr id="59" name="Group 58">
+                <a:extLst>
+                  <a:ext uri="{FF2B5EF4-FFF2-40B4-BE49-F238E27FC236}">
+                    <a16:creationId xmlns:a16="http://schemas.microsoft.com/office/drawing/2014/main" id="{E1898DAE-D676-4258-A022-4AAD26AE40CD}"/>
+                  </a:ext>
+                </a:extLst>
+              </p:cNvPr>
+              <p:cNvGrpSpPr/>
+              <p:nvPr/>
+            </p:nvGrpSpPr>
+            <p:grpSpPr>
+              <a:xfrm>
+                <a:off x="4641224" y="3877136"/>
+                <a:ext cx="3130469" cy="410897"/>
+                <a:chOff x="8023546" y="3173125"/>
+                <a:chExt cx="2358222" cy="333918"/>
+              </a:xfrm>
+            </p:grpSpPr>
+            <p:sp>
+              <p:nvSpPr>
+                <p:cNvPr id="60" name="Rectangle 59">
+                  <a:extLst>
+                    <a:ext uri="{FF2B5EF4-FFF2-40B4-BE49-F238E27FC236}">
+                      <a16:creationId xmlns:a16="http://schemas.microsoft.com/office/drawing/2014/main" id="{32E70F0A-E3E5-470E-8B77-CC04BF989BC5}"/>
+                    </a:ext>
+                  </a:extLst>
+                </p:cNvPr>
+                <p:cNvSpPr/>
+                <p:nvPr/>
+              </p:nvSpPr>
+              <p:spPr>
+                <a:xfrm>
+                  <a:off x="8023546" y="3173125"/>
+                  <a:ext cx="2358222" cy="328039"/>
+                </a:xfrm>
+                <a:prstGeom prst="rect">
+                  <a:avLst/>
+                </a:prstGeom>
+                <a:solidFill>
+                  <a:schemeClr val="accent1">
+                    <a:lumMod val="75000"/>
+                  </a:schemeClr>
+                </a:solidFill>
+                <a:ln>
+                  <a:solidFill>
+                    <a:srgbClr val="002060"/>
+                  </a:solidFill>
+                  <a:prstDash val="solid"/>
+                </a:ln>
+              </p:spPr>
+              <p:style>
+                <a:lnRef idx="2">
+                  <a:schemeClr val="accent1">
+                    <a:shade val="50000"/>
+                  </a:schemeClr>
+                </a:lnRef>
+                <a:fillRef idx="1">
+                  <a:schemeClr val="accent1"/>
+                </a:fillRef>
+                <a:effectRef idx="0">
+                  <a:schemeClr val="accent1"/>
+                </a:effectRef>
+                <a:fontRef idx="minor">
+                  <a:schemeClr val="lt1"/>
+                </a:fontRef>
+              </p:style>
+              <p:txBody>
+                <a:bodyPr rtlCol="0" anchor="ctr"/>
+                <a:lstStyle/>
+                <a:p>
+                  <a:pPr algn="ctr"/>
+                  <a:endParaRPr lang="en-US"/>
+                </a:p>
+              </p:txBody>
+            </p:sp>
+            <p:sp>
+              <p:nvSpPr>
+                <p:cNvPr id="61" name="TextBox 60">
+                  <a:extLst>
+                    <a:ext uri="{FF2B5EF4-FFF2-40B4-BE49-F238E27FC236}">
+                      <a16:creationId xmlns:a16="http://schemas.microsoft.com/office/drawing/2014/main" id="{5C96CCE8-AB30-4CEC-99A8-673FB72B38AC}"/>
+                    </a:ext>
+                  </a:extLst>
+                </p:cNvPr>
+                <p:cNvSpPr txBox="1"/>
+                <p:nvPr/>
+              </p:nvSpPr>
+              <p:spPr>
+                <a:xfrm>
+                  <a:off x="8470467" y="3206903"/>
+                  <a:ext cx="1482622" cy="300140"/>
+                </a:xfrm>
+                <a:prstGeom prst="rect">
+                  <a:avLst/>
+                </a:prstGeom>
+                <a:noFill/>
+                <a:ln>
+                  <a:noFill/>
+                  <a:prstDash val="solid"/>
+                </a:ln>
+              </p:spPr>
+              <p:txBody>
+                <a:bodyPr wrap="square" rtlCol="0">
+                  <a:spAutoFit/>
+                </a:bodyPr>
+                <a:lstStyle/>
+                <a:p>
+                  <a:pPr algn="ctr"/>
+                  <a:r>
+                    <a:rPr lang="en-US" b="1" dirty="0"/>
+                    <a:t>First Nations</a:t>
+                  </a:r>
+                </a:p>
+              </p:txBody>
+            </p:sp>
+          </p:grpSp>
           <p:sp>
             <p:nvSpPr>
-              <p:cNvPr id="67" name="Rectangle 66">
+              <p:cNvPr id="55" name="Rectangle 54">
                 <a:extLst>
                   <a:ext uri="{FF2B5EF4-FFF2-40B4-BE49-F238E27FC236}">
-                    <a16:creationId xmlns:a16="http://schemas.microsoft.com/office/drawing/2014/main" id="{38C1A38B-CF86-43F5-91C2-C98DDD8891EE}"/>
+                    <a16:creationId xmlns:a16="http://schemas.microsoft.com/office/drawing/2014/main" id="{09A9C5E2-A204-47E7-9CEF-573175361E4F}"/>
                   </a:ext>
                 </a:extLst>
               </p:cNvPr>
@@ -4171,140 +4756,18 @@
             </p:nvSpPr>
             <p:spPr>
               <a:xfrm>
-                <a:off x="8220673" y="2801341"/>
-                <a:ext cx="833152" cy="1045655"/>
-              </a:xfrm>
-              <a:prstGeom prst="rect">
-                <a:avLst/>
-              </a:prstGeom>
-              <a:solidFill>
-                <a:schemeClr val="accent1">
-                  <a:lumMod val="40000"/>
-                  <a:lumOff val="60000"/>
-                </a:schemeClr>
-              </a:solidFill>
-              <a:ln>
-                <a:solidFill>
-                  <a:srgbClr val="002060"/>
-                </a:solidFill>
-              </a:ln>
-            </p:spPr>
-            <p:style>
-              <a:lnRef idx="2">
-                <a:schemeClr val="accent1">
-                  <a:shade val="50000"/>
-                </a:schemeClr>
-              </a:lnRef>
-              <a:fillRef idx="1">
-                <a:schemeClr val="accent1"/>
-              </a:fillRef>
-              <a:effectRef idx="0">
-                <a:schemeClr val="accent1"/>
-              </a:effectRef>
-              <a:fontRef idx="minor">
-                <a:schemeClr val="lt1"/>
-              </a:fontRef>
-            </p:style>
-            <p:txBody>
-              <a:bodyPr rtlCol="0" anchor="ctr"/>
-              <a:lstStyle/>
-              <a:p>
-                <a:pPr algn="ctr"/>
-                <a:endParaRPr lang="en-US"/>
-              </a:p>
-            </p:txBody>
-          </p:sp>
-          <p:sp>
-            <p:nvSpPr>
-              <p:cNvPr id="77" name="TextBox 76">
-                <a:extLst>
-                  <a:ext uri="{FF2B5EF4-FFF2-40B4-BE49-F238E27FC236}">
-                    <a16:creationId xmlns:a16="http://schemas.microsoft.com/office/drawing/2014/main" id="{C9A200B3-76D4-478F-8B97-14D2A846CC11}"/>
-                  </a:ext>
-                </a:extLst>
-              </p:cNvPr>
-              <p:cNvSpPr txBox="1"/>
-              <p:nvPr/>
-            </p:nvSpPr>
-            <p:spPr>
-              <a:xfrm>
-                <a:off x="8237174" y="3268062"/>
-                <a:ext cx="781393" cy="650785"/>
+                <a:off x="4641228" y="2439060"/>
+                <a:ext cx="3130469" cy="3560097"/>
               </a:xfrm>
               <a:prstGeom prst="rect">
                 <a:avLst/>
               </a:prstGeom>
               <a:noFill/>
-            </p:spPr>
-            <p:txBody>
-              <a:bodyPr wrap="square" rtlCol="0">
-                <a:spAutoFit/>
-              </a:bodyPr>
-              <a:lstStyle/>
-              <a:p>
-                <a:pPr algn="ctr"/>
-                <a:r>
-                  <a:rPr lang="en-US" b="1" dirty="0">
-                    <a:solidFill>
-                      <a:srgbClr val="FF0000"/>
-                    </a:solidFill>
-                  </a:rPr>
-                  <a:t>Upper Basin</a:t>
-                </a:r>
-              </a:p>
-            </p:txBody>
-          </p:sp>
-        </p:grpSp>
-        <p:grpSp>
-          <p:nvGrpSpPr>
-            <p:cNvPr id="83" name="Group 82">
-              <a:extLst>
-                <a:ext uri="{FF2B5EF4-FFF2-40B4-BE49-F238E27FC236}">
-                  <a16:creationId xmlns:a16="http://schemas.microsoft.com/office/drawing/2014/main" id="{DF37BEBE-1BC8-4A6D-BC16-FF1BD7EFC79E}"/>
-                </a:ext>
-              </a:extLst>
-            </p:cNvPr>
-            <p:cNvGrpSpPr/>
-            <p:nvPr/>
-          </p:nvGrpSpPr>
-          <p:grpSpPr>
-            <a:xfrm>
-              <a:off x="3181311" y="3647194"/>
-              <a:ext cx="859056" cy="928006"/>
-              <a:chOff x="7557679" y="3059460"/>
-              <a:chExt cx="781393" cy="928006"/>
-            </a:xfrm>
-          </p:grpSpPr>
-          <p:sp>
-            <p:nvSpPr>
-              <p:cNvPr id="63" name="Rectangle 62">
-                <a:extLst>
-                  <a:ext uri="{FF2B5EF4-FFF2-40B4-BE49-F238E27FC236}">
-                    <a16:creationId xmlns:a16="http://schemas.microsoft.com/office/drawing/2014/main" id="{9046A7DC-7210-411D-9AC4-0A007C1D3546}"/>
-                  </a:ext>
-                </a:extLst>
-              </p:cNvPr>
-              <p:cNvSpPr/>
-              <p:nvPr/>
-            </p:nvSpPr>
-            <p:spPr>
-              <a:xfrm>
-                <a:off x="7594522" y="3059460"/>
-                <a:ext cx="713232" cy="870332"/>
-              </a:xfrm>
-              <a:prstGeom prst="rect">
-                <a:avLst/>
-              </a:prstGeom>
-              <a:solidFill>
-                <a:schemeClr val="accent1">
-                  <a:lumMod val="20000"/>
-                  <a:lumOff val="80000"/>
-                </a:schemeClr>
-              </a:solidFill>
-              <a:ln>
+              <a:ln w="38100">
                 <a:solidFill>
-                  <a:srgbClr val="002060"/>
+                  <a:srgbClr val="FF0000"/>
                 </a:solidFill>
+                <a:prstDash val="solid"/>
               </a:ln>
             </p:spPr>
             <p:style>
@@ -4332,171 +4795,59 @@
               </a:p>
             </p:txBody>
           </p:sp>
-          <p:sp>
-            <p:nvSpPr>
-              <p:cNvPr id="78" name="TextBox 77">
-                <a:extLst>
-                  <a:ext uri="{FF2B5EF4-FFF2-40B4-BE49-F238E27FC236}">
-                    <a16:creationId xmlns:a16="http://schemas.microsoft.com/office/drawing/2014/main" id="{9F520DFA-0C08-44DE-9BDA-D3602BDC2D63}"/>
-                  </a:ext>
-                </a:extLst>
-              </p:cNvPr>
-              <p:cNvSpPr txBox="1"/>
-              <p:nvPr/>
-            </p:nvSpPr>
-            <p:spPr>
-              <a:xfrm>
-                <a:off x="7557679" y="3341135"/>
-                <a:ext cx="781393" cy="646331"/>
-              </a:xfrm>
-              <a:prstGeom prst="rect">
-                <a:avLst/>
-              </a:prstGeom>
-              <a:noFill/>
-            </p:spPr>
-            <p:txBody>
-              <a:bodyPr wrap="square" rtlCol="0">
-                <a:spAutoFit/>
-              </a:bodyPr>
-              <a:lstStyle/>
-              <a:p>
-                <a:pPr algn="ctr"/>
-                <a:r>
-                  <a:rPr lang="en-US" b="1" dirty="0">
-                    <a:solidFill>
-                      <a:srgbClr val="FF0000"/>
-                    </a:solidFill>
-                  </a:rPr>
-                  <a:t>Lower Basin</a:t>
-                </a:r>
-              </a:p>
-            </p:txBody>
-          </p:sp>
         </p:grpSp>
-        <p:grpSp>
-          <p:nvGrpSpPr>
-            <p:cNvPr id="18" name="Group 17">
+        <p:cxnSp>
+          <p:nvCxnSpPr>
+            <p:cNvPr id="47" name="Straight Arrow Connector 46">
               <a:extLst>
                 <a:ext uri="{FF2B5EF4-FFF2-40B4-BE49-F238E27FC236}">
-                  <a16:creationId xmlns:a16="http://schemas.microsoft.com/office/drawing/2014/main" id="{B34EE1C0-D8A9-4912-96CC-752A5EEB6AFC}"/>
+                  <a16:creationId xmlns:a16="http://schemas.microsoft.com/office/drawing/2014/main" id="{07A3CBFC-8625-477E-8AB8-19E08D505A1C}"/>
                 </a:ext>
               </a:extLst>
             </p:cNvPr>
-            <p:cNvGrpSpPr/>
+            <p:cNvCxnSpPr>
+              <a:cxnSpLocks/>
+            </p:cNvCxnSpPr>
             <p:nvPr/>
-          </p:nvGrpSpPr>
-          <p:grpSpPr>
+          </p:nvCxnSpPr>
+          <p:spPr>
             <a:xfrm>
-              <a:off x="4779093" y="4045207"/>
-              <a:ext cx="903622" cy="532700"/>
-              <a:chOff x="8817813" y="4059751"/>
-              <a:chExt cx="903622" cy="532700"/>
+              <a:off x="5244917" y="1930163"/>
+              <a:ext cx="497431" cy="485589"/>
             </a:xfrm>
-          </p:grpSpPr>
-          <p:sp>
-            <p:nvSpPr>
-              <p:cNvPr id="70" name="Rectangle 69">
-                <a:extLst>
-                  <a:ext uri="{FF2B5EF4-FFF2-40B4-BE49-F238E27FC236}">
-                    <a16:creationId xmlns:a16="http://schemas.microsoft.com/office/drawing/2014/main" id="{AF724A9B-8497-401D-A6D2-92EE159A34B3}"/>
-                  </a:ext>
-                </a:extLst>
-              </p:cNvPr>
-              <p:cNvSpPr/>
-              <p:nvPr/>
-            </p:nvSpPr>
-            <p:spPr>
-              <a:xfrm>
-                <a:off x="8879090" y="4059751"/>
-                <a:ext cx="813123" cy="474313"/>
-              </a:xfrm>
-              <a:prstGeom prst="rect">
-                <a:avLst/>
-              </a:prstGeom>
+            <a:prstGeom prst="straightConnector1">
+              <a:avLst/>
+            </a:prstGeom>
+            <a:ln w="28575">
               <a:solidFill>
                 <a:schemeClr val="accent1">
-                  <a:lumMod val="60000"/>
-                  <a:lumOff val="40000"/>
+                  <a:lumMod val="75000"/>
                 </a:schemeClr>
               </a:solidFill>
-              <a:ln>
-                <a:solidFill>
-                  <a:srgbClr val="002060"/>
-                </a:solidFill>
-              </a:ln>
-            </p:spPr>
-            <p:style>
-              <a:lnRef idx="2">
-                <a:schemeClr val="accent1">
-                  <a:shade val="50000"/>
-                </a:schemeClr>
-              </a:lnRef>
-              <a:fillRef idx="1">
-                <a:schemeClr val="accent1"/>
-              </a:fillRef>
-              <a:effectRef idx="0">
-                <a:schemeClr val="accent1"/>
-              </a:effectRef>
-              <a:fontRef idx="minor">
-                <a:schemeClr val="lt1"/>
-              </a:fontRef>
-            </p:style>
-            <p:txBody>
-              <a:bodyPr rtlCol="0" anchor="ctr"/>
-              <a:lstStyle/>
-              <a:p>
-                <a:pPr algn="ctr"/>
-                <a:endParaRPr lang="en-US"/>
-              </a:p>
-            </p:txBody>
-          </p:sp>
-          <p:sp>
-            <p:nvSpPr>
-              <p:cNvPr id="79" name="TextBox 78">
-                <a:extLst>
-                  <a:ext uri="{FF2B5EF4-FFF2-40B4-BE49-F238E27FC236}">
-                    <a16:creationId xmlns:a16="http://schemas.microsoft.com/office/drawing/2014/main" id="{2D2C449B-9E78-4807-9778-D0916980C2F0}"/>
-                  </a:ext>
-                </a:extLst>
-              </p:cNvPr>
-              <p:cNvSpPr txBox="1"/>
-              <p:nvPr/>
-            </p:nvSpPr>
-            <p:spPr>
-              <a:xfrm>
-                <a:off x="8817813" y="4223119"/>
-                <a:ext cx="903622" cy="369332"/>
-              </a:xfrm>
-              <a:prstGeom prst="rect">
-                <a:avLst/>
-              </a:prstGeom>
-              <a:noFill/>
-            </p:spPr>
-            <p:txBody>
-              <a:bodyPr wrap="square" rtlCol="0">
-                <a:spAutoFit/>
-              </a:bodyPr>
-              <a:lstStyle/>
-              <a:p>
-                <a:pPr algn="ctr"/>
-                <a:r>
-                  <a:rPr lang="en-US" b="1" dirty="0">
-                    <a:solidFill>
-                      <a:srgbClr val="FF0000"/>
-                    </a:solidFill>
-                  </a:rPr>
-                  <a:t>Mexico</a:t>
-                </a:r>
-              </a:p>
-            </p:txBody>
-          </p:sp>
-        </p:grpSp>
+              <a:tailEnd type="arrow"/>
+            </a:ln>
+          </p:spPr>
+          <p:style>
+            <a:lnRef idx="1">
+              <a:schemeClr val="accent1"/>
+            </a:lnRef>
+            <a:fillRef idx="0">
+              <a:schemeClr val="accent1"/>
+            </a:fillRef>
+            <a:effectRef idx="0">
+              <a:schemeClr val="accent1"/>
+            </a:effectRef>
+            <a:fontRef idx="minor">
+              <a:schemeClr val="tx1"/>
+            </a:fontRef>
+          </p:style>
+        </p:cxnSp>
         <p:sp>
           <p:nvSpPr>
-            <p:cNvPr id="89" name="TextBox 88">
+            <p:cNvPr id="37" name="TextBox 36">
               <a:extLst>
                 <a:ext uri="{FF2B5EF4-FFF2-40B4-BE49-F238E27FC236}">
-                  <a16:creationId xmlns:a16="http://schemas.microsoft.com/office/drawing/2014/main" id="{2423B0B4-06DF-4FD3-B985-7B545F0A815E}"/>
+                  <a16:creationId xmlns:a16="http://schemas.microsoft.com/office/drawing/2014/main" id="{E58FBB45-2543-470E-B0FD-3EE6C2E57E09}"/>
                 </a:ext>
               </a:extLst>
             </p:cNvPr>
@@ -4505,8 +4856,8 @@
           </p:nvSpPr>
           <p:spPr>
             <a:xfrm>
-              <a:off x="8534305" y="2628039"/>
-              <a:ext cx="1288114" cy="1015663"/>
+              <a:off x="7971226" y="3594982"/>
+              <a:ext cx="1587018" cy="1077218"/>
             </a:xfrm>
             <a:prstGeom prst="rect">
               <a:avLst/>
@@ -4521,24 +4872,67 @@
             <a:p>
               <a:pPr algn="ctr"/>
               <a:r>
-                <a:rPr lang="en-US" sz="2000" b="1" dirty="0">
+                <a:rPr lang="en-US" sz="1600" b="1" dirty="0">
                   <a:solidFill>
-                    <a:schemeClr val="accent5">
-                      <a:lumMod val="50000"/>
-                    </a:schemeClr>
+                    <a:srgbClr val="FF0000"/>
                   </a:solidFill>
                 </a:rPr>
-                <a:t>Natural inflow to Powell</a:t>
+                <a:t>Combined Powell + Mead active reservoir storage</a:t>
               </a:r>
             </a:p>
           </p:txBody>
         </p:sp>
+        <p:cxnSp>
+          <p:nvCxnSpPr>
+            <p:cNvPr id="30" name="Straight Arrow Connector 29">
+              <a:extLst>
+                <a:ext uri="{FF2B5EF4-FFF2-40B4-BE49-F238E27FC236}">
+                  <a16:creationId xmlns:a16="http://schemas.microsoft.com/office/drawing/2014/main" id="{151467C8-70C3-4F42-A7AF-C5E070783D58}"/>
+                </a:ext>
+              </a:extLst>
+            </p:cNvPr>
+            <p:cNvCxnSpPr>
+              <a:cxnSpLocks/>
+            </p:cNvCxnSpPr>
+            <p:nvPr/>
+          </p:nvCxnSpPr>
+          <p:spPr>
+            <a:xfrm>
+              <a:off x="4616744" y="6202837"/>
+              <a:ext cx="3154948" cy="4012"/>
+            </a:xfrm>
+            <a:prstGeom prst="straightConnector1">
+              <a:avLst/>
+            </a:prstGeom>
+            <a:ln w="19050">
+              <a:solidFill>
+                <a:srgbClr val="FF0000"/>
+              </a:solidFill>
+              <a:headEnd type="triangle"/>
+              <a:tailEnd type="triangle"/>
+            </a:ln>
+          </p:spPr>
+          <p:style>
+            <a:lnRef idx="1">
+              <a:schemeClr val="accent1"/>
+            </a:lnRef>
+            <a:fillRef idx="0">
+              <a:schemeClr val="accent1"/>
+            </a:fillRef>
+            <a:effectRef idx="0">
+              <a:schemeClr val="accent1"/>
+            </a:effectRef>
+            <a:fontRef idx="minor">
+              <a:schemeClr val="tx1"/>
+            </a:fontRef>
+          </p:style>
+        </p:cxnSp>
         <p:sp>
           <p:nvSpPr>
-            <p:cNvPr id="92" name="TextBox 91">
+            <p:cNvPr id="36" name="TextBox 35">
               <a:extLst>
                 <a:ext uri="{FF2B5EF4-FFF2-40B4-BE49-F238E27FC236}">
-                  <a16:creationId xmlns:a16="http://schemas.microsoft.com/office/drawing/2014/main" id="{08E0B068-F2C5-4EA7-9649-5E3FFA78AB04}"/>
+                  <a16:creationId xmlns:a16="http://schemas.microsoft.com/office/drawing/2014/main" id="{4646EBCA-F328-49C2-80D1-C418C5567EBE}"/>
                 </a:ext>
               </a:extLst>
             </p:cNvPr>
@@ -4546,14 +4940,16 @@
             <p:nvPr/>
           </p:nvSpPr>
           <p:spPr>
-            <a:xfrm rot="16200000">
-              <a:off x="1912397" y="3191481"/>
-              <a:ext cx="1930423" cy="400110"/>
+            <a:xfrm>
+              <a:off x="4813191" y="6052961"/>
+              <a:ext cx="2762054" cy="307777"/>
             </a:xfrm>
             <a:prstGeom prst="rect">
               <a:avLst/>
             </a:prstGeom>
-            <a:noFill/>
+            <a:solidFill>
+              <a:schemeClr val="bg1"/>
+            </a:solidFill>
           </p:spPr>
           <p:txBody>
             <a:bodyPr wrap="square" rtlCol="0">
@@ -4563,370 +4959,68 @@
             <a:p>
               <a:pPr algn="ctr"/>
               <a:r>
-                <a:rPr lang="en-US" sz="2000" b="1" dirty="0">
+                <a:rPr lang="en-US" sz="1400" b="1" dirty="0">
                   <a:solidFill>
-                    <a:schemeClr val="accent5">
-                      <a:lumMod val="50000"/>
-                    </a:schemeClr>
+                    <a:srgbClr val="FF0000"/>
                   </a:solidFill>
                 </a:rPr>
-                <a:t>Mead Release</a:t>
+                <a:t>Region of combined management</a:t>
               </a:r>
             </a:p>
           </p:txBody>
         </p:sp>
-        <p:grpSp>
-          <p:nvGrpSpPr>
-            <p:cNvPr id="21" name="Group 20">
+        <p:cxnSp>
+          <p:nvCxnSpPr>
+            <p:cNvPr id="69" name="Straight Arrow Connector 68">
               <a:extLst>
                 <a:ext uri="{FF2B5EF4-FFF2-40B4-BE49-F238E27FC236}">
-                  <a16:creationId xmlns:a16="http://schemas.microsoft.com/office/drawing/2014/main" id="{6E81736E-2099-4E83-9FDF-4732E56C8364}"/>
+                  <a16:creationId xmlns:a16="http://schemas.microsoft.com/office/drawing/2014/main" id="{DA352E58-7083-49E0-8D04-754237F638A2}"/>
                 </a:ext>
               </a:extLst>
             </p:cNvPr>
-            <p:cNvGrpSpPr/>
+            <p:cNvCxnSpPr>
+              <a:cxnSpLocks/>
+            </p:cNvCxnSpPr>
             <p:nvPr/>
-          </p:nvGrpSpPr>
-          <p:grpSpPr>
+          </p:nvCxnSpPr>
+          <p:spPr>
             <a:xfrm>
-              <a:off x="7306170" y="3158972"/>
-              <a:ext cx="1258213" cy="1367128"/>
-              <a:chOff x="10291733" y="3177028"/>
-              <a:chExt cx="905757" cy="1367128"/>
+              <a:off x="7971226" y="2445683"/>
+              <a:ext cx="0" cy="3553474"/>
             </a:xfrm>
-          </p:grpSpPr>
-          <p:sp>
-            <p:nvSpPr>
-              <p:cNvPr id="82" name="Rectangle 81">
-                <a:extLst>
-                  <a:ext uri="{FF2B5EF4-FFF2-40B4-BE49-F238E27FC236}">
-                    <a16:creationId xmlns:a16="http://schemas.microsoft.com/office/drawing/2014/main" id="{DE60CD3E-6F06-4281-A03C-0690876DD08A}"/>
-                  </a:ext>
-                </a:extLst>
-              </p:cNvPr>
-              <p:cNvSpPr/>
-              <p:nvPr/>
-            </p:nvSpPr>
-            <p:spPr>
-              <a:xfrm>
-                <a:off x="10377018" y="3177028"/>
-                <a:ext cx="711487" cy="1357036"/>
-              </a:xfrm>
-              <a:prstGeom prst="rect">
-                <a:avLst/>
-              </a:prstGeom>
+            <a:prstGeom prst="straightConnector1">
+              <a:avLst/>
+            </a:prstGeom>
+            <a:ln w="19050">
               <a:solidFill>
-                <a:schemeClr val="accent2"/>
+                <a:srgbClr val="FF0000"/>
               </a:solidFill>
-              <a:ln>
-                <a:solidFill>
-                  <a:srgbClr val="002060"/>
-                </a:solidFill>
-              </a:ln>
-            </p:spPr>
-            <p:style>
-              <a:lnRef idx="2">
-                <a:schemeClr val="accent1">
-                  <a:shade val="50000"/>
-                </a:schemeClr>
-              </a:lnRef>
-              <a:fillRef idx="1">
-                <a:schemeClr val="accent1"/>
-              </a:fillRef>
-              <a:effectRef idx="0">
-                <a:schemeClr val="accent1"/>
-              </a:effectRef>
-              <a:fontRef idx="minor">
-                <a:schemeClr val="lt1"/>
-              </a:fontRef>
-            </p:style>
-            <p:txBody>
-              <a:bodyPr rtlCol="0" anchor="ctr"/>
-              <a:lstStyle/>
-              <a:p>
-                <a:pPr algn="ctr"/>
-                <a:endParaRPr lang="en-US"/>
-              </a:p>
-            </p:txBody>
-          </p:sp>
-          <p:sp>
-            <p:nvSpPr>
-              <p:cNvPr id="88" name="TextBox 87">
-                <a:extLst>
-                  <a:ext uri="{FF2B5EF4-FFF2-40B4-BE49-F238E27FC236}">
-                    <a16:creationId xmlns:a16="http://schemas.microsoft.com/office/drawing/2014/main" id="{9125E6FD-8297-4895-95C7-ACF0860DC807}"/>
-                  </a:ext>
-                </a:extLst>
-              </p:cNvPr>
-              <p:cNvSpPr txBox="1"/>
-              <p:nvPr/>
-            </p:nvSpPr>
-            <p:spPr>
-              <a:xfrm>
-                <a:off x="10291733" y="3897825"/>
-                <a:ext cx="905757" cy="646331"/>
-              </a:xfrm>
-              <a:prstGeom prst="rect">
-                <a:avLst/>
-              </a:prstGeom>
-              <a:noFill/>
-            </p:spPr>
-            <p:txBody>
-              <a:bodyPr wrap="square" rtlCol="0">
-                <a:spAutoFit/>
-              </a:bodyPr>
-              <a:lstStyle/>
-              <a:p>
-                <a:pPr algn="ctr"/>
-                <a:r>
-                  <a:rPr lang="en-US" b="1" dirty="0"/>
-                  <a:t>Shared Reserve</a:t>
-                </a:r>
-              </a:p>
-            </p:txBody>
-          </p:sp>
-        </p:grpSp>
-        <p:grpSp>
-          <p:nvGrpSpPr>
-            <p:cNvPr id="56" name="Group 55">
-              <a:extLst>
-                <a:ext uri="{FF2B5EF4-FFF2-40B4-BE49-F238E27FC236}">
-                  <a16:creationId xmlns:a16="http://schemas.microsoft.com/office/drawing/2014/main" id="{158C8481-6E0F-4AAB-A87B-D84885668DDF}"/>
-                </a:ext>
-              </a:extLst>
-            </p:cNvPr>
-            <p:cNvGrpSpPr/>
-            <p:nvPr/>
-          </p:nvGrpSpPr>
-          <p:grpSpPr>
-            <a:xfrm>
-              <a:off x="5587515" y="4217194"/>
-              <a:ext cx="1001015" cy="507758"/>
-              <a:chOff x="9567914" y="4323675"/>
-              <a:chExt cx="883841" cy="369332"/>
-            </a:xfrm>
-          </p:grpSpPr>
-          <p:sp>
-            <p:nvSpPr>
-              <p:cNvPr id="57" name="Rectangle 56">
-                <a:extLst>
-                  <a:ext uri="{FF2B5EF4-FFF2-40B4-BE49-F238E27FC236}">
-                    <a16:creationId xmlns:a16="http://schemas.microsoft.com/office/drawing/2014/main" id="{B7745B29-FC79-4E5E-B2EB-F4094C43C6D7}"/>
-                  </a:ext>
-                </a:extLst>
-              </p:cNvPr>
-              <p:cNvSpPr/>
-              <p:nvPr/>
-            </p:nvSpPr>
-            <p:spPr>
-              <a:xfrm>
-                <a:off x="9630390" y="4325454"/>
-                <a:ext cx="713232" cy="214997"/>
-              </a:xfrm>
-              <a:prstGeom prst="rect">
-                <a:avLst/>
-              </a:prstGeom>
-              <a:solidFill>
-                <a:schemeClr val="accent1">
-                  <a:lumMod val="75000"/>
-                </a:schemeClr>
-              </a:solidFill>
-              <a:ln>
-                <a:solidFill>
-                  <a:srgbClr val="002060"/>
-                </a:solidFill>
-              </a:ln>
-            </p:spPr>
-            <p:style>
-              <a:lnRef idx="2">
-                <a:schemeClr val="accent1">
-                  <a:shade val="50000"/>
-                </a:schemeClr>
-              </a:lnRef>
-              <a:fillRef idx="1">
-                <a:schemeClr val="accent1"/>
-              </a:fillRef>
-              <a:effectRef idx="0">
-                <a:schemeClr val="accent1"/>
-              </a:effectRef>
-              <a:fontRef idx="minor">
-                <a:schemeClr val="lt1"/>
-              </a:fontRef>
-            </p:style>
-            <p:txBody>
-              <a:bodyPr rtlCol="0" anchor="ctr"/>
-              <a:lstStyle/>
-              <a:p>
-                <a:pPr algn="ctr"/>
-                <a:endParaRPr lang="en-US"/>
-              </a:p>
-            </p:txBody>
-          </p:sp>
-          <p:sp>
-            <p:nvSpPr>
-              <p:cNvPr id="58" name="TextBox 57">
-                <a:extLst>
-                  <a:ext uri="{FF2B5EF4-FFF2-40B4-BE49-F238E27FC236}">
-                    <a16:creationId xmlns:a16="http://schemas.microsoft.com/office/drawing/2014/main" id="{B5987608-C45B-4394-99DA-2987C6434ED0}"/>
-                  </a:ext>
-                </a:extLst>
-              </p:cNvPr>
-              <p:cNvSpPr txBox="1"/>
-              <p:nvPr/>
-            </p:nvSpPr>
-            <p:spPr>
-              <a:xfrm>
-                <a:off x="9567914" y="4323675"/>
-                <a:ext cx="883841" cy="369332"/>
-              </a:xfrm>
-              <a:prstGeom prst="rect">
-                <a:avLst/>
-              </a:prstGeom>
-              <a:noFill/>
-            </p:spPr>
-            <p:txBody>
-              <a:bodyPr wrap="square" rtlCol="0">
-                <a:spAutoFit/>
-              </a:bodyPr>
-              <a:lstStyle/>
-              <a:p>
-                <a:pPr algn="ctr"/>
-                <a:r>
-                  <a:rPr lang="en-US" b="1" dirty="0">
-                    <a:solidFill>
-                      <a:srgbClr val="FF0000"/>
-                    </a:solidFill>
-                  </a:rPr>
-                  <a:t>Delta</a:t>
-                </a:r>
-              </a:p>
-            </p:txBody>
-          </p:sp>
-        </p:grpSp>
-        <p:grpSp>
-          <p:nvGrpSpPr>
-            <p:cNvPr id="59" name="Group 58">
-              <a:extLst>
-                <a:ext uri="{FF2B5EF4-FFF2-40B4-BE49-F238E27FC236}">
-                  <a16:creationId xmlns:a16="http://schemas.microsoft.com/office/drawing/2014/main" id="{E1898DAE-D676-4258-A022-4AAD26AE40CD}"/>
-                </a:ext>
-              </a:extLst>
-            </p:cNvPr>
-            <p:cNvGrpSpPr/>
-            <p:nvPr/>
-          </p:nvGrpSpPr>
-          <p:grpSpPr>
-            <a:xfrm>
-              <a:off x="6371133" y="3928869"/>
-              <a:ext cx="1140371" cy="646333"/>
-              <a:chOff x="9548659" y="4066138"/>
-              <a:chExt cx="859056" cy="525247"/>
-            </a:xfrm>
-          </p:grpSpPr>
-          <p:sp>
-            <p:nvSpPr>
-              <p:cNvPr id="60" name="Rectangle 59">
-                <a:extLst>
-                  <a:ext uri="{FF2B5EF4-FFF2-40B4-BE49-F238E27FC236}">
-                    <a16:creationId xmlns:a16="http://schemas.microsoft.com/office/drawing/2014/main" id="{32E70F0A-E3E5-470E-8B77-CC04BF989BC5}"/>
-                  </a:ext>
-                </a:extLst>
-              </p:cNvPr>
-              <p:cNvSpPr/>
-              <p:nvPr/>
-            </p:nvSpPr>
-            <p:spPr>
-              <a:xfrm>
-                <a:off x="9630390" y="4066138"/>
-                <a:ext cx="713232" cy="474313"/>
-              </a:xfrm>
-              <a:prstGeom prst="rect">
-                <a:avLst/>
-              </a:prstGeom>
-              <a:solidFill>
-                <a:schemeClr val="accent1">
-                  <a:lumMod val="75000"/>
-                </a:schemeClr>
-              </a:solidFill>
-              <a:ln>
-                <a:solidFill>
-                  <a:srgbClr val="002060"/>
-                </a:solidFill>
-              </a:ln>
-            </p:spPr>
-            <p:style>
-              <a:lnRef idx="2">
-                <a:schemeClr val="accent1">
-                  <a:shade val="50000"/>
-                </a:schemeClr>
-              </a:lnRef>
-              <a:fillRef idx="1">
-                <a:schemeClr val="accent1"/>
-              </a:fillRef>
-              <a:effectRef idx="0">
-                <a:schemeClr val="accent1"/>
-              </a:effectRef>
-              <a:fontRef idx="minor">
-                <a:schemeClr val="lt1"/>
-              </a:fontRef>
-            </p:style>
-            <p:txBody>
-              <a:bodyPr rtlCol="0" anchor="ctr"/>
-              <a:lstStyle/>
-              <a:p>
-                <a:pPr algn="ctr"/>
-                <a:endParaRPr lang="en-US"/>
-              </a:p>
-            </p:txBody>
-          </p:sp>
-          <p:sp>
-            <p:nvSpPr>
-              <p:cNvPr id="61" name="TextBox 60">
-                <a:extLst>
-                  <a:ext uri="{FF2B5EF4-FFF2-40B4-BE49-F238E27FC236}">
-                    <a16:creationId xmlns:a16="http://schemas.microsoft.com/office/drawing/2014/main" id="{5C96CCE8-AB30-4CEC-99A8-673FB72B38AC}"/>
-                  </a:ext>
-                </a:extLst>
-              </p:cNvPr>
-              <p:cNvSpPr txBox="1"/>
-              <p:nvPr/>
-            </p:nvSpPr>
-            <p:spPr>
-              <a:xfrm>
-                <a:off x="9548659" y="4066140"/>
-                <a:ext cx="859056" cy="525245"/>
-              </a:xfrm>
-              <a:prstGeom prst="rect">
-                <a:avLst/>
-              </a:prstGeom>
-              <a:noFill/>
-            </p:spPr>
-            <p:txBody>
-              <a:bodyPr wrap="square" rtlCol="0">
-                <a:spAutoFit/>
-              </a:bodyPr>
-              <a:lstStyle/>
-              <a:p>
-                <a:pPr algn="ctr"/>
-                <a:r>
-                  <a:rPr lang="en-US" b="1" dirty="0">
-                    <a:solidFill>
-                      <a:srgbClr val="FF0000"/>
-                    </a:solidFill>
-                  </a:rPr>
-                  <a:t>First Nations</a:t>
-                </a:r>
-              </a:p>
-            </p:txBody>
-          </p:sp>
-        </p:grpSp>
+              <a:headEnd type="triangle"/>
+              <a:tailEnd type="triangle"/>
+            </a:ln>
+          </p:spPr>
+          <p:style>
+            <a:lnRef idx="1">
+              <a:schemeClr val="accent1"/>
+            </a:lnRef>
+            <a:fillRef idx="0">
+              <a:schemeClr val="accent1"/>
+            </a:fillRef>
+            <a:effectRef idx="0">
+              <a:schemeClr val="accent1"/>
+            </a:effectRef>
+            <a:fontRef idx="minor">
+              <a:schemeClr val="tx1"/>
+            </a:fontRef>
+          </p:style>
+        </p:cxnSp>
       </p:grpSp>
       <p:sp>
         <p:nvSpPr>
-          <p:cNvPr id="2" name="TextBox 1">
-            <a:extLst>
-              <a:ext uri="{FF2B5EF4-FFF2-40B4-BE49-F238E27FC236}">
-                <a16:creationId xmlns:a16="http://schemas.microsoft.com/office/drawing/2014/main" id="{BE1B5A34-CA3C-4FE9-8D6B-0582DFA3804A}"/>
+          <p:cNvPr id="34" name="TextBox 33">
+            <a:extLst>
+              <a:ext uri="{FF2B5EF4-FFF2-40B4-BE49-F238E27FC236}">
+                <a16:creationId xmlns:a16="http://schemas.microsoft.com/office/drawing/2014/main" id="{DEAED8B9-E85D-4C0F-9130-20E6768CD412}"/>
               </a:ext>
             </a:extLst>
           </p:cNvPr>
@@ -4935,18 +5029,13 @@
         </p:nvSpPr>
         <p:spPr>
           <a:xfrm>
-            <a:off x="9462187" y="5337531"/>
-            <a:ext cx="2048612" cy="1015663"/>
+            <a:off x="320759" y="428687"/>
+            <a:ext cx="11358126" cy="830997"/>
           </a:xfrm>
           <a:prstGeom prst="rect">
             <a:avLst/>
           </a:prstGeom>
           <a:noFill/>
-          <a:ln>
-            <a:solidFill>
-              <a:schemeClr val="tx1"/>
-            </a:solidFill>
-          </a:ln>
         </p:spPr>
         <p:txBody>
           <a:bodyPr wrap="square" rtlCol="0">
@@ -4956,34 +5045,13 @@
           <a:p>
             <a:pPr algn="ctr"/>
             <a:r>
-              <a:rPr lang="en-US" sz="2000" b="1" dirty="0"/>
-              <a:t>Account Types</a:t>
-            </a:r>
-          </a:p>
-          <a:p>
-            <a:pPr algn="ctr"/>
-            <a:r>
-              <a:rPr lang="en-US" sz="2000" dirty="0">
+              <a:rPr lang="en-US" sz="2400" b="1" dirty="0">
                 <a:solidFill>
-                  <a:schemeClr val="accent1">
-                    <a:lumMod val="75000"/>
-                  </a:schemeClr>
+                  <a:srgbClr val="002060"/>
                 </a:solidFill>
+                <a:latin typeface="Comic Sans MS" panose="030F0702030302020204" pitchFamily="66" charset="0"/>
               </a:rPr>
-              <a:t>Individual (blues)</a:t>
-            </a:r>
-          </a:p>
-          <a:p>
-            <a:pPr algn="ctr"/>
-            <a:r>
-              <a:rPr lang="en-US" sz="2000" dirty="0">
-                <a:solidFill>
-                  <a:schemeClr val="accent2">
-                    <a:lumMod val="75000"/>
-                  </a:schemeClr>
-                </a:solidFill>
-              </a:rPr>
-              <a:t>Joint (orange)</a:t>
+              <a:t>Colorado River basin account balances are the water stored in a combined Lake Powell-Lake Mead system.</a:t>
             </a:r>
           </a:p>
         </p:txBody>
@@ -4991,7 +5059,7 @@
     </p:spTree>
     <p:extLst>
       <p:ext uri="{BB962C8B-B14F-4D97-AF65-F5344CB8AC3E}">
-        <p14:creationId xmlns:p14="http://schemas.microsoft.com/office/powerpoint/2010/main" val="3063433608"/>
+        <p14:creationId xmlns:p14="http://schemas.microsoft.com/office/powerpoint/2010/main" val="1311224653"/>
       </p:ext>
     </p:extLst>
   </p:cSld>

</xml_diff>